<commit_message>
updating lecture slides and scripts
</commit_message>
<xml_diff>
--- a/lectures/le111_model_selection.pptx
+++ b/lectures/le111_model_selection.pptx
@@ -5,7 +5,7 @@
     <p:sldMasterId id="2147483660" r:id="rId1"/>
   </p:sldMasterIdLst>
   <p:notesMasterIdLst>
-    <p:notesMasterId r:id="rId42"/>
+    <p:notesMasterId r:id="rId43"/>
   </p:notesMasterIdLst>
   <p:sldIdLst>
     <p:sldId id="256" r:id="rId2"/>
@@ -31,23 +31,24 @@
     <p:sldId id="281" r:id="rId22"/>
     <p:sldId id="292" r:id="rId23"/>
     <p:sldId id="293" r:id="rId24"/>
-    <p:sldId id="294" r:id="rId25"/>
-    <p:sldId id="295" r:id="rId26"/>
-    <p:sldId id="266" r:id="rId27"/>
-    <p:sldId id="296" r:id="rId28"/>
-    <p:sldId id="297" r:id="rId29"/>
-    <p:sldId id="268" r:id="rId30"/>
-    <p:sldId id="267" r:id="rId31"/>
-    <p:sldId id="304" r:id="rId32"/>
-    <p:sldId id="303" r:id="rId33"/>
-    <p:sldId id="299" r:id="rId34"/>
-    <p:sldId id="273" r:id="rId35"/>
-    <p:sldId id="298" r:id="rId36"/>
-    <p:sldId id="265" r:id="rId37"/>
-    <p:sldId id="300" r:id="rId38"/>
-    <p:sldId id="301" r:id="rId39"/>
-    <p:sldId id="274" r:id="rId40"/>
-    <p:sldId id="302" r:id="rId41"/>
+    <p:sldId id="258" r:id="rId25"/>
+    <p:sldId id="294" r:id="rId26"/>
+    <p:sldId id="295" r:id="rId27"/>
+    <p:sldId id="266" r:id="rId28"/>
+    <p:sldId id="296" r:id="rId29"/>
+    <p:sldId id="297" r:id="rId30"/>
+    <p:sldId id="268" r:id="rId31"/>
+    <p:sldId id="267" r:id="rId32"/>
+    <p:sldId id="304" r:id="rId33"/>
+    <p:sldId id="303" r:id="rId34"/>
+    <p:sldId id="299" r:id="rId35"/>
+    <p:sldId id="273" r:id="rId36"/>
+    <p:sldId id="298" r:id="rId37"/>
+    <p:sldId id="265" r:id="rId38"/>
+    <p:sldId id="300" r:id="rId39"/>
+    <p:sldId id="301" r:id="rId40"/>
+    <p:sldId id="274" r:id="rId41"/>
+    <p:sldId id="302" r:id="rId42"/>
   </p:sldIdLst>
   <p:sldSz cx="9144000" cy="6858000" type="screen4x3"/>
   <p:notesSz cx="6858000" cy="9144000"/>
@@ -174,6 +175,7 @@
             <p14:sldId id="281"/>
             <p14:sldId id="292"/>
             <p14:sldId id="293"/>
+            <p14:sldId id="258"/>
             <p14:sldId id="294"/>
             <p14:sldId id="295"/>
             <p14:sldId id="266"/>
@@ -295,7 +297,7 @@
           <a:p>
             <a:fld id="{F00CAE13-515D-42AB-B1C6-C768CFAA9040}" type="datetimeFigureOut">
               <a:rPr lang="en-US" smtClean="0"/>
-              <a:t>4/14/20</a:t>
+              <a:t>4/21/20</a:t>
             </a:fld>
             <a:endParaRPr lang="en-US"/>
           </a:p>
@@ -696,7 +698,7 @@
             <a:fld id="{F16B42BE-E9E8-4C91-8CAE-DCF3A8462AA2}" type="datetimeFigureOut">
               <a:rPr lang="en-US" smtClean="0"/>
               <a:pPr/>
-              <a:t>4/14/20</a:t>
+              <a:t>4/21/20</a:t>
             </a:fld>
             <a:endParaRPr lang="en-US"/>
           </a:p>
@@ -868,7 +870,7 @@
             <a:fld id="{F16B42BE-E9E8-4C91-8CAE-DCF3A8462AA2}" type="datetimeFigureOut">
               <a:rPr lang="en-US" smtClean="0"/>
               <a:pPr/>
-              <a:t>4/14/20</a:t>
+              <a:t>4/21/20</a:t>
             </a:fld>
             <a:endParaRPr lang="en-US"/>
           </a:p>
@@ -1050,7 +1052,7 @@
             <a:fld id="{F16B42BE-E9E8-4C91-8CAE-DCF3A8462AA2}" type="datetimeFigureOut">
               <a:rPr lang="en-US" smtClean="0"/>
               <a:pPr/>
-              <a:t>4/14/20</a:t>
+              <a:t>4/21/20</a:t>
             </a:fld>
             <a:endParaRPr lang="en-US"/>
           </a:p>
@@ -1240,7 +1242,7 @@
             <a:fld id="{F16B42BE-E9E8-4C91-8CAE-DCF3A8462AA2}" type="datetimeFigureOut">
               <a:rPr lang="en-US" smtClean="0"/>
               <a:pPr/>
-              <a:t>4/14/20</a:t>
+              <a:t>4/21/20</a:t>
             </a:fld>
             <a:endParaRPr lang="en-US"/>
           </a:p>
@@ -1486,7 +1488,7 @@
             <a:fld id="{F16B42BE-E9E8-4C91-8CAE-DCF3A8462AA2}" type="datetimeFigureOut">
               <a:rPr lang="en-US" smtClean="0"/>
               <a:pPr/>
-              <a:t>4/14/20</a:t>
+              <a:t>4/21/20</a:t>
             </a:fld>
             <a:endParaRPr lang="en-US"/>
           </a:p>
@@ -1720,7 +1722,7 @@
             <a:fld id="{F16B42BE-E9E8-4C91-8CAE-DCF3A8462AA2}" type="datetimeFigureOut">
               <a:rPr lang="en-US" smtClean="0"/>
               <a:pPr/>
-              <a:t>4/14/20</a:t>
+              <a:t>4/21/20</a:t>
             </a:fld>
             <a:endParaRPr lang="en-US"/>
           </a:p>
@@ -2089,7 +2091,7 @@
             <a:fld id="{F16B42BE-E9E8-4C91-8CAE-DCF3A8462AA2}" type="datetimeFigureOut">
               <a:rPr lang="en-US" smtClean="0"/>
               <a:pPr/>
-              <a:t>4/14/20</a:t>
+              <a:t>4/21/20</a:t>
             </a:fld>
             <a:endParaRPr lang="en-US"/>
           </a:p>
@@ -2209,7 +2211,7 @@
             <a:fld id="{F16B42BE-E9E8-4C91-8CAE-DCF3A8462AA2}" type="datetimeFigureOut">
               <a:rPr lang="en-US" smtClean="0"/>
               <a:pPr/>
-              <a:t>4/14/20</a:t>
+              <a:t>4/21/20</a:t>
             </a:fld>
             <a:endParaRPr lang="en-US"/>
           </a:p>
@@ -2306,7 +2308,7 @@
             <a:fld id="{F16B42BE-E9E8-4C91-8CAE-DCF3A8462AA2}" type="datetimeFigureOut">
               <a:rPr lang="en-US" smtClean="0"/>
               <a:pPr/>
-              <a:t>4/14/20</a:t>
+              <a:t>4/21/20</a:t>
             </a:fld>
             <a:endParaRPr lang="en-US"/>
           </a:p>
@@ -2585,7 +2587,7 @@
             <a:fld id="{F16B42BE-E9E8-4C91-8CAE-DCF3A8462AA2}" type="datetimeFigureOut">
               <a:rPr lang="en-US" smtClean="0"/>
               <a:pPr/>
-              <a:t>4/14/20</a:t>
+              <a:t>4/21/20</a:t>
             </a:fld>
             <a:endParaRPr lang="en-US"/>
           </a:p>
@@ -2844,7 +2846,7 @@
             <a:fld id="{F16B42BE-E9E8-4C91-8CAE-DCF3A8462AA2}" type="datetimeFigureOut">
               <a:rPr lang="en-US" smtClean="0"/>
               <a:pPr/>
-              <a:t>4/14/20</a:t>
+              <a:t>4/21/20</a:t>
             </a:fld>
             <a:endParaRPr lang="en-US"/>
           </a:p>
@@ -3057,7 +3059,7 @@
             <a:fld id="{F16B42BE-E9E8-4C91-8CAE-DCF3A8462AA2}" type="datetimeFigureOut">
               <a:rPr lang="en-US" smtClean="0"/>
               <a:pPr/>
-              <a:t>4/14/20</a:t>
+              <a:t>4/21/20</a:t>
             </a:fld>
             <a:endParaRPr lang="en-US"/>
           </a:p>
@@ -5142,8 +5144,8 @@
           <a:lstStyle/>
           <a:p>
             <a:r>
-              <a:rPr lang="en-US" dirty="0"/>
-              <a:t>LRT examples</a:t>
+              <a:rPr lang="en-US" b="1" dirty="0"/>
+              <a:t>Model comparison - LRT</a:t>
             </a:r>
           </a:p>
         </p:txBody>
@@ -5160,17 +5162,135 @@
         </p:nvSpPr>
         <p:spPr/>
         <p:txBody>
-          <a:bodyPr/>
-          <a:lstStyle/>
-          <a:p>
-            <a:endParaRPr lang="en-US"/>
+          <a:bodyPr>
+            <a:normAutofit fontScale="77500" lnSpcReduction="20000"/>
+          </a:bodyPr>
+          <a:lstStyle/>
+          <a:p>
+            <a:r>
+              <a:rPr lang="en-US" dirty="0"/>
+              <a:t>When you do an </a:t>
+            </a:r>
+            <a:r>
+              <a:rPr lang="en-US" dirty="0" err="1"/>
+              <a:t>anova</a:t>
+            </a:r>
+            <a:r>
+              <a:rPr lang="en-US" dirty="0"/>
+              <a:t>() on a regular lm or </a:t>
+            </a:r>
+            <a:r>
+              <a:rPr lang="en-US" dirty="0" err="1"/>
+              <a:t>glm</a:t>
+            </a:r>
+            <a:r>
+              <a:rPr lang="en-US" dirty="0"/>
+              <a:t> (e.g. Poisson, Gamma, Binomial) you need to list the null model </a:t>
+            </a:r>
+            <a:r>
+              <a:rPr lang="en-US" u="sng" dirty="0"/>
+              <a:t>first</a:t>
+            </a:r>
+            <a:endParaRPr lang="en-US" dirty="0"/>
+          </a:p>
+          <a:p>
+            <a:endParaRPr lang="en-US" dirty="0"/>
+          </a:p>
+          <a:p>
+            <a:r>
+              <a:rPr lang="en-US" dirty="0"/>
+              <a:t>The LRT (</a:t>
+            </a:r>
+            <a:r>
+              <a:rPr lang="en-US" dirty="0" err="1"/>
+              <a:t>anova</a:t>
+            </a:r>
+            <a:r>
+              <a:rPr lang="en-US" dirty="0"/>
+              <a:t>()) for these “objects” will always consider the null model as the first argument</a:t>
+            </a:r>
+          </a:p>
+          <a:p>
+            <a:pPr lvl="1"/>
+            <a:r>
+              <a:rPr lang="en-US" dirty="0"/>
+              <a:t>This isn’t the case for all types of objects </a:t>
+            </a:r>
+            <a:r>
+              <a:rPr lang="mr-IN" dirty="0"/>
+              <a:t>–</a:t>
+            </a:r>
+            <a:r>
+              <a:rPr lang="en-US" dirty="0"/>
+              <a:t> hence the confusion</a:t>
+            </a:r>
+          </a:p>
+          <a:p>
+            <a:pPr lvl="1"/>
+            <a:r>
+              <a:rPr lang="en-US" dirty="0"/>
+              <a:t>If you do not list the null model first, you may get wonky output because it is doing the subtraction incorrectly resulting in negative values with no meaning in the chi-squared distribution!</a:t>
+            </a:r>
+          </a:p>
+          <a:p>
+            <a:r>
+              <a:rPr lang="en-US" dirty="0"/>
+              <a:t>I suggest stepping through your models from simplest as null to increasingly more complex</a:t>
+            </a:r>
+          </a:p>
+          <a:p>
+            <a:pPr lvl="1"/>
+            <a:r>
+              <a:rPr lang="en-US" dirty="0"/>
+              <a:t>E.g. N ~ 1 vs </a:t>
+            </a:r>
+            <a:r>
+              <a:rPr lang="en-US" dirty="0" err="1"/>
+              <a:t>N~light</a:t>
+            </a:r>
+            <a:r>
+              <a:rPr lang="en-US" dirty="0"/>
+              <a:t>, then </a:t>
+            </a:r>
+            <a:r>
+              <a:rPr lang="en-US" dirty="0" err="1"/>
+              <a:t>N~light</a:t>
+            </a:r>
+            <a:r>
+              <a:rPr lang="en-US" dirty="0"/>
+              <a:t> vs </a:t>
+            </a:r>
+            <a:r>
+              <a:rPr lang="en-US" dirty="0" err="1"/>
+              <a:t>N~light+time</a:t>
+            </a:r>
+            <a:r>
+              <a:rPr lang="en-US" dirty="0"/>
+              <a:t>, then </a:t>
+            </a:r>
+            <a:r>
+              <a:rPr lang="en-US" dirty="0" err="1"/>
+              <a:t>N~light+time</a:t>
+            </a:r>
+            <a:r>
+              <a:rPr lang="en-US" dirty="0"/>
+              <a:t> vs </a:t>
+            </a:r>
+            <a:r>
+              <a:rPr lang="en-US" dirty="0" err="1"/>
+              <a:t>N~light</a:t>
+            </a:r>
+            <a:r>
+              <a:rPr lang="en-US" dirty="0"/>
+              <a:t>*time</a:t>
+            </a:r>
           </a:p>
         </p:txBody>
       </p:sp>
     </p:spTree>
     <p:extLst>
       <p:ext uri="{BB962C8B-B14F-4D97-AF65-F5344CB8AC3E}">
-        <p14:creationId xmlns:p14="http://schemas.microsoft.com/office/powerpoint/2010/main" val="1377046409"/>
+        <p14:creationId xmlns:p14="http://schemas.microsoft.com/office/powerpoint/2010/main" val="2508225711"/>
       </p:ext>
     </p:extLst>
   </p:cSld>
@@ -5214,7 +5334,7 @@
           <a:p>
             <a:r>
               <a:rPr lang="en-US" dirty="0"/>
-              <a:t>Information Criteria	</a:t>
+              <a:t>LRT examples</a:t>
             </a:r>
           </a:p>
         </p:txBody>
@@ -5231,45 +5351,17 @@
         </p:nvSpPr>
         <p:spPr/>
         <p:txBody>
-          <a:bodyPr>
-            <a:normAutofit lnSpcReduction="10000"/>
-          </a:bodyPr>
-          <a:lstStyle/>
-          <a:p>
-            <a:r>
-              <a:rPr lang="en-US" dirty="0"/>
-              <a:t>These are also called information theoretic approaches</a:t>
-            </a:r>
-          </a:p>
-          <a:p>
-            <a:endParaRPr lang="en-US" dirty="0"/>
-          </a:p>
-          <a:p>
-            <a:r>
-              <a:rPr lang="en-US" dirty="0"/>
-              <a:t>These are commonly used, but still have many </a:t>
-            </a:r>
-            <a:r>
-              <a:rPr lang="en-US" dirty="0" err="1"/>
-              <a:t>disadvantanges</a:t>
-            </a:r>
-            <a:endParaRPr lang="en-US" dirty="0"/>
-          </a:p>
-          <a:p>
-            <a:endParaRPr lang="en-US" dirty="0"/>
-          </a:p>
-          <a:p>
-            <a:r>
-              <a:rPr lang="en-US" dirty="0"/>
-              <a:t>IC methods find the model that minimizes some criterion that is based on the likelihood and a penalty term, which is usually based on the number of parameters</a:t>
-            </a:r>
+          <a:bodyPr/>
+          <a:lstStyle/>
+          <a:p>
+            <a:endParaRPr lang="en-US"/>
           </a:p>
         </p:txBody>
       </p:sp>
     </p:spTree>
     <p:extLst>
       <p:ext uri="{BB962C8B-B14F-4D97-AF65-F5344CB8AC3E}">
-        <p14:creationId xmlns:p14="http://schemas.microsoft.com/office/powerpoint/2010/main" val="762809762"/>
+        <p14:creationId xmlns:p14="http://schemas.microsoft.com/office/powerpoint/2010/main" val="1377046409"/>
       </p:ext>
     </p:extLst>
   </p:cSld>
@@ -5313,7 +5405,7 @@
           <a:p>
             <a:r>
               <a:rPr lang="en-US" dirty="0"/>
-              <a:t>AIC (BIC, etc.) model selection</a:t>
+              <a:t>Information Criteria	</a:t>
             </a:r>
           </a:p>
         </p:txBody>
@@ -5328,57 +5420,39 @@
             <p:ph idx="1"/>
           </p:nvPr>
         </p:nvSpPr>
-        <p:spPr>
-          <a:xfrm>
-            <a:off x="628650" y="1544630"/>
-            <a:ext cx="7886700" cy="5147353"/>
-          </a:xfrm>
-        </p:spPr>
+        <p:spPr/>
         <p:txBody>
           <a:bodyPr>
-            <a:normAutofit/>
+            <a:normAutofit lnSpcReduction="10000"/>
           </a:bodyPr>
           <a:lstStyle/>
           <a:p>
             <a:r>
               <a:rPr lang="en-US" dirty="0"/>
-              <a:t>Proposed philosophy is inherently different </a:t>
-            </a:r>
-          </a:p>
-          <a:p>
-            <a:pPr lvl="1"/>
-            <a:r>
-              <a:rPr lang="en-US" dirty="0"/>
-              <a:t>but it is often (ab)used to answer the same questions as null hypothesis testing</a:t>
-            </a:r>
-          </a:p>
-          <a:p>
-            <a:pPr lvl="1"/>
+              <a:t>These are also called information theoretic approaches</a:t>
+            </a:r>
+          </a:p>
+          <a:p>
             <a:endParaRPr lang="en-US" dirty="0"/>
           </a:p>
           <a:p>
-            <a:pPr lvl="1"/>
-            <a:r>
-              <a:rPr lang="en-US" dirty="0"/>
-              <a:t>Frequentist/Null hypothesis testing: do predictor variables X1, X2, and/or X3 influence Y?</a:t>
-            </a:r>
-          </a:p>
-          <a:p>
-            <a:pPr lvl="1"/>
+            <a:r>
+              <a:rPr lang="en-US" dirty="0"/>
+              <a:t>These are commonly used, but still have many </a:t>
+            </a:r>
+            <a:r>
+              <a:rPr lang="en-US" dirty="0" err="1"/>
+              <a:t>disadvantanges</a:t>
+            </a:r>
             <a:endParaRPr lang="en-US" dirty="0"/>
           </a:p>
           <a:p>
-            <a:pPr lvl="1"/>
-            <a:r>
-              <a:rPr lang="en-US" dirty="0"/>
-              <a:t>IC approach: which of the proposed models fit the data best?</a:t>
-            </a:r>
-          </a:p>
-          <a:p>
-            <a:pPr lvl="2"/>
-            <a:r>
-              <a:rPr lang="en-US" dirty="0"/>
-              <a:t>E.g. AIC = 2k - 2ln(L); k = # parameters, L = likelihood</a:t>
+            <a:endParaRPr lang="en-US" dirty="0"/>
+          </a:p>
+          <a:p>
+            <a:r>
+              <a:rPr lang="en-US" dirty="0"/>
+              <a:t>IC methods find the model that minimizes some criterion that is based on the likelihood and a penalty term, which is usually based on the number of parameters</a:t>
             </a:r>
           </a:p>
         </p:txBody>
@@ -5386,7 +5460,7 @@
     </p:spTree>
     <p:extLst>
       <p:ext uri="{BB962C8B-B14F-4D97-AF65-F5344CB8AC3E}">
-        <p14:creationId xmlns:p14="http://schemas.microsoft.com/office/powerpoint/2010/main" val="3829928013"/>
+        <p14:creationId xmlns:p14="http://schemas.microsoft.com/office/powerpoint/2010/main" val="762809762"/>
       </p:ext>
     </p:extLst>
   </p:cSld>
@@ -5430,7 +5504,7 @@
           <a:p>
             <a:r>
               <a:rPr lang="en-US" dirty="0"/>
-              <a:t>AIC Procedures</a:t>
+              <a:t>AIC (BIC, etc.) model selection</a:t>
             </a:r>
           </a:p>
         </p:txBody>
@@ -5445,113 +5519,65 @@
             <p:ph idx="1"/>
           </p:nvPr>
         </p:nvSpPr>
-        <p:spPr/>
+        <p:spPr>
+          <a:xfrm>
+            <a:off x="628650" y="1544630"/>
+            <a:ext cx="7886700" cy="5147353"/>
+          </a:xfrm>
+        </p:spPr>
         <p:txBody>
           <a:bodyPr>
-            <a:normAutofit fontScale="85000" lnSpcReduction="20000"/>
+            <a:normAutofit/>
           </a:bodyPr>
           <a:lstStyle/>
           <a:p>
-            <a:pPr marL="457200" indent="-457200">
-              <a:buFont typeface="+mj-lt"/>
-              <a:buAutoNum type="arabicPeriod"/>
-            </a:pPr>
-            <a:r>
-              <a:rPr lang="en-US" dirty="0"/>
-              <a:t>Build a priori candidate model set</a:t>
-            </a:r>
-          </a:p>
-          <a:p>
-            <a:pPr marL="457200" indent="-457200">
-              <a:buFont typeface="+mj-lt"/>
-              <a:buAutoNum type="arabicPeriod"/>
-            </a:pPr>
+            <a:r>
+              <a:rPr lang="en-US" dirty="0"/>
+              <a:t>Proposed philosophy is inherently different </a:t>
+            </a:r>
+          </a:p>
+          <a:p>
+            <a:pPr lvl="1"/>
+            <a:r>
+              <a:rPr lang="en-US" dirty="0"/>
+              <a:t>but it is often (ab)used to answer the same questions as null hypothesis testing</a:t>
+            </a:r>
+          </a:p>
+          <a:p>
+            <a:pPr lvl="1"/>
             <a:endParaRPr lang="en-US" dirty="0"/>
           </a:p>
           <a:p>
-            <a:pPr marL="457200" indent="-457200">
-              <a:buFont typeface="+mj-lt"/>
-              <a:buAutoNum type="arabicPeriod"/>
-            </a:pPr>
-            <a:r>
-              <a:rPr lang="en-US" dirty="0"/>
-              <a:t>Fit models to data</a:t>
-            </a:r>
-          </a:p>
-          <a:p>
-            <a:pPr marL="457200" indent="-457200">
-              <a:buFont typeface="+mj-lt"/>
-              <a:buAutoNum type="arabicPeriod"/>
-            </a:pPr>
+            <a:pPr lvl="1"/>
+            <a:r>
+              <a:rPr lang="en-US" dirty="0"/>
+              <a:t>Frequentist/Null hypothesis testing: do predictor variables X1, X2, and/or X3 influence Y?</a:t>
+            </a:r>
+          </a:p>
+          <a:p>
+            <a:pPr lvl="1"/>
             <a:endParaRPr lang="en-US" dirty="0"/>
           </a:p>
           <a:p>
-            <a:pPr marL="457200" indent="-457200">
-              <a:buFont typeface="+mj-lt"/>
-              <a:buAutoNum type="arabicPeriod"/>
-            </a:pPr>
-            <a:r>
-              <a:rPr lang="en-US" dirty="0"/>
-              <a:t>Rank by AIC, calculate weights (based on </a:t>
-            </a:r>
-            <a:r>
-              <a:rPr lang="en-US" dirty="0">
-                <a:sym typeface="Symbol" panose="05050102010706020507" pitchFamily="18" charset="2"/>
-              </a:rPr>
-              <a:t>AIC</a:t>
-            </a:r>
-            <a:r>
-              <a:rPr lang="en-US" dirty="0"/>
-              <a:t>)</a:t>
-            </a:r>
-          </a:p>
-          <a:p>
-            <a:pPr marL="457200" indent="-457200">
-              <a:buFont typeface="+mj-lt"/>
-              <a:buAutoNum type="arabicPeriod"/>
-            </a:pPr>
-            <a:endParaRPr lang="en-US" dirty="0"/>
-          </a:p>
-          <a:p>
-            <a:pPr marL="457200" indent="-457200">
-              <a:buFont typeface="+mj-lt"/>
-              <a:buAutoNum type="arabicPeriod"/>
-            </a:pPr>
-            <a:r>
-              <a:rPr lang="en-US" dirty="0"/>
-              <a:t>Can estimate model coefficients and make predictions by model averaging using AIC weights of all models making up X% of weights (e.g. X = 95%)</a:t>
-            </a:r>
-          </a:p>
-          <a:p>
-            <a:pPr marL="457200" indent="-457200">
-              <a:buFont typeface="+mj-lt"/>
-              <a:buAutoNum type="arabicPeriod"/>
-            </a:pPr>
-            <a:endParaRPr lang="en-US" dirty="0"/>
-          </a:p>
-          <a:p>
-            <a:pPr marL="457200" indent="-457200">
-              <a:buFont typeface="+mj-lt"/>
-              <a:buAutoNum type="arabicPeriod"/>
-            </a:pPr>
-            <a:r>
-              <a:rPr lang="en-US" dirty="0"/>
-              <a:t>Can select models with greatest support (must be &gt;2 AIC away)</a:t>
-            </a:r>
-          </a:p>
-          <a:p>
-            <a:pPr marL="514350" indent="-514350">
-              <a:buFont typeface="+mj-lt"/>
-              <a:buAutoNum type="arabicPeriod"/>
-            </a:pPr>
-            <a:endParaRPr lang="en-US" dirty="0"/>
+            <a:pPr lvl="1"/>
+            <a:r>
+              <a:rPr lang="en-US" dirty="0"/>
+              <a:t>IC approach: which of the proposed models fit the data best?</a:t>
+            </a:r>
+          </a:p>
+          <a:p>
+            <a:pPr lvl="2"/>
+            <a:r>
+              <a:rPr lang="en-US" dirty="0"/>
+              <a:t>E.g. AIC = 2k - 2ln(L); k = # parameters, L = likelihood</a:t>
+            </a:r>
           </a:p>
         </p:txBody>
       </p:sp>
     </p:spTree>
     <p:extLst>
       <p:ext uri="{BB962C8B-B14F-4D97-AF65-F5344CB8AC3E}">
-        <p14:creationId xmlns:p14="http://schemas.microsoft.com/office/powerpoint/2010/main" val="1169835076"/>
+        <p14:creationId xmlns:p14="http://schemas.microsoft.com/office/powerpoint/2010/main" val="3829928013"/>
       </p:ext>
     </p:extLst>
   </p:cSld>
@@ -5595,7 +5621,7 @@
           <a:p>
             <a:r>
               <a:rPr lang="en-US" dirty="0"/>
-              <a:t>AIC Examples</a:t>
+              <a:t>AIC Procedures</a:t>
             </a:r>
           </a:p>
         </p:txBody>
@@ -5612,17 +5638,111 @@
         </p:nvSpPr>
         <p:spPr/>
         <p:txBody>
-          <a:bodyPr/>
-          <a:lstStyle/>
-          <a:p>
-            <a:endParaRPr lang="en-US"/>
+          <a:bodyPr>
+            <a:normAutofit fontScale="85000" lnSpcReduction="20000"/>
+          </a:bodyPr>
+          <a:lstStyle/>
+          <a:p>
+            <a:pPr marL="457200" indent="-457200">
+              <a:buFont typeface="+mj-lt"/>
+              <a:buAutoNum type="arabicPeriod"/>
+            </a:pPr>
+            <a:r>
+              <a:rPr lang="en-US" dirty="0"/>
+              <a:t>Build a priori candidate model set</a:t>
+            </a:r>
+          </a:p>
+          <a:p>
+            <a:pPr marL="457200" indent="-457200">
+              <a:buFont typeface="+mj-lt"/>
+              <a:buAutoNum type="arabicPeriod"/>
+            </a:pPr>
+            <a:endParaRPr lang="en-US" dirty="0"/>
+          </a:p>
+          <a:p>
+            <a:pPr marL="457200" indent="-457200">
+              <a:buFont typeface="+mj-lt"/>
+              <a:buAutoNum type="arabicPeriod"/>
+            </a:pPr>
+            <a:r>
+              <a:rPr lang="en-US" dirty="0"/>
+              <a:t>Fit models to data</a:t>
+            </a:r>
+          </a:p>
+          <a:p>
+            <a:pPr marL="457200" indent="-457200">
+              <a:buFont typeface="+mj-lt"/>
+              <a:buAutoNum type="arabicPeriod"/>
+            </a:pPr>
+            <a:endParaRPr lang="en-US" dirty="0"/>
+          </a:p>
+          <a:p>
+            <a:pPr marL="457200" indent="-457200">
+              <a:buFont typeface="+mj-lt"/>
+              <a:buAutoNum type="arabicPeriod"/>
+            </a:pPr>
+            <a:r>
+              <a:rPr lang="en-US" dirty="0"/>
+              <a:t>Rank by AIC, calculate weights (based on </a:t>
+            </a:r>
+            <a:r>
+              <a:rPr lang="en-US" dirty="0">
+                <a:sym typeface="Symbol" panose="05050102010706020507" pitchFamily="18" charset="2"/>
+              </a:rPr>
+              <a:t>AIC</a:t>
+            </a:r>
+            <a:r>
+              <a:rPr lang="en-US" dirty="0"/>
+              <a:t>)</a:t>
+            </a:r>
+          </a:p>
+          <a:p>
+            <a:pPr marL="457200" indent="-457200">
+              <a:buFont typeface="+mj-lt"/>
+              <a:buAutoNum type="arabicPeriod"/>
+            </a:pPr>
+            <a:endParaRPr lang="en-US" dirty="0"/>
+          </a:p>
+          <a:p>
+            <a:pPr marL="457200" indent="-457200">
+              <a:buFont typeface="+mj-lt"/>
+              <a:buAutoNum type="arabicPeriod"/>
+            </a:pPr>
+            <a:r>
+              <a:rPr lang="en-US" dirty="0"/>
+              <a:t>Can estimate model coefficients and make predictions by model averaging using AIC weights of all models making up X% of weights (e.g. X = 95%)</a:t>
+            </a:r>
+          </a:p>
+          <a:p>
+            <a:pPr marL="457200" indent="-457200">
+              <a:buFont typeface="+mj-lt"/>
+              <a:buAutoNum type="arabicPeriod"/>
+            </a:pPr>
+            <a:endParaRPr lang="en-US" dirty="0"/>
+          </a:p>
+          <a:p>
+            <a:pPr marL="457200" indent="-457200">
+              <a:buFont typeface="+mj-lt"/>
+              <a:buAutoNum type="arabicPeriod"/>
+            </a:pPr>
+            <a:r>
+              <a:rPr lang="en-US" dirty="0"/>
+              <a:t>Can select models with greatest support (must be &gt;2 AIC away)</a:t>
+            </a:r>
+          </a:p>
+          <a:p>
+            <a:pPr marL="514350" indent="-514350">
+              <a:buFont typeface="+mj-lt"/>
+              <a:buAutoNum type="arabicPeriod"/>
+            </a:pPr>
+            <a:endParaRPr lang="en-US" dirty="0"/>
           </a:p>
         </p:txBody>
       </p:sp>
     </p:spTree>
     <p:extLst>
       <p:ext uri="{BB962C8B-B14F-4D97-AF65-F5344CB8AC3E}">
-        <p14:creationId xmlns:p14="http://schemas.microsoft.com/office/powerpoint/2010/main" val="2030345735"/>
+        <p14:creationId xmlns:p14="http://schemas.microsoft.com/office/powerpoint/2010/main" val="1169835076"/>
       </p:ext>
     </p:extLst>
   </p:cSld>
@@ -5666,7 +5786,7 @@
           <a:p>
             <a:r>
               <a:rPr lang="en-US" dirty="0"/>
-              <a:t>AIC advantages</a:t>
+              <a:t>AIC Examples</a:t>
             </a:r>
           </a:p>
         </p:txBody>
@@ -5686,38 +5806,14 @@
           <a:bodyPr/>
           <a:lstStyle/>
           <a:p>
-            <a:r>
-              <a:rPr lang="en-US" dirty="0"/>
-              <a:t>Results in 1 or more final models that have “some support” from the data</a:t>
-            </a:r>
-          </a:p>
-          <a:p>
-            <a:endParaRPr lang="en-US" dirty="0"/>
-          </a:p>
-          <a:p>
-            <a:r>
-              <a:rPr lang="en-US" dirty="0"/>
-              <a:t>Comparing non-nested models is easy</a:t>
-            </a:r>
-          </a:p>
-          <a:p>
-            <a:endParaRPr lang="en-US" dirty="0"/>
-          </a:p>
-          <a:p>
-            <a:r>
-              <a:rPr lang="en-US" dirty="0"/>
-              <a:t>Combining results from multiple models is straight forward</a:t>
-            </a:r>
-          </a:p>
-          <a:p>
-            <a:endParaRPr lang="en-US" dirty="0"/>
+            <a:endParaRPr lang="en-US"/>
           </a:p>
         </p:txBody>
       </p:sp>
     </p:spTree>
     <p:extLst>
       <p:ext uri="{BB962C8B-B14F-4D97-AF65-F5344CB8AC3E}">
-        <p14:creationId xmlns:p14="http://schemas.microsoft.com/office/powerpoint/2010/main" val="2185811067"/>
+        <p14:creationId xmlns:p14="http://schemas.microsoft.com/office/powerpoint/2010/main" val="2030345735"/>
       </p:ext>
     </p:extLst>
   </p:cSld>
@@ -5853,7 +5949,7 @@
           <a:p>
             <a:r>
               <a:rPr lang="en-US" dirty="0"/>
-              <a:t>AIC challenges</a:t>
+              <a:t>AIC advantages</a:t>
             </a:r>
           </a:p>
         </p:txBody>
@@ -5868,21 +5964,14 @@
             <p:ph idx="1"/>
           </p:nvPr>
         </p:nvSpPr>
-        <p:spPr>
-          <a:xfrm>
-            <a:off x="628650" y="1518870"/>
-            <a:ext cx="7886700" cy="5339130"/>
-          </a:xfrm>
-        </p:spPr>
-        <p:txBody>
-          <a:bodyPr>
-            <a:normAutofit fontScale="55000" lnSpcReduction="20000"/>
-          </a:bodyPr>
-          <a:lstStyle/>
-          <a:p>
-            <a:r>
-              <a:rPr lang="en-US" dirty="0"/>
-              <a:t>What is the candidate model set?  Omissions or biases in forming model set can result in poor inference/prediction</a:t>
+        <p:spPr/>
+        <p:txBody>
+          <a:bodyPr/>
+          <a:lstStyle/>
+          <a:p>
+            <a:r>
+              <a:rPr lang="en-US" dirty="0"/>
+              <a:t>Results in 1 or more final models that have “some support” from the data</a:t>
             </a:r>
           </a:p>
           <a:p>
@@ -5891,7 +5980,7 @@
           <a:p>
             <a:r>
               <a:rPr lang="en-US" dirty="0"/>
-              <a:t>Using “all possible model subsets” can produce an enormous number of models that is difficult to interpret and results in spurious correlations</a:t>
+              <a:t>Comparing non-nested models is easy</a:t>
             </a:r>
           </a:p>
           <a:p>
@@ -5900,51 +5989,7 @@
           <a:p>
             <a:r>
               <a:rPr lang="en-US" dirty="0"/>
-              <a:t>If we fit models with several “versions” of a predictor (e.g. Temp, Temp</a:t>
-            </a:r>
-            <a:r>
-              <a:rPr lang="en-US" baseline="30000" dirty="0"/>
-              <a:t>2</a:t>
-            </a:r>
-            <a:r>
-              <a:rPr lang="en-US" dirty="0"/>
-              <a:t>, Log(Temp)) and only one model without this predictor, we are much more likely to find that this predictor is present in one of the best fitting models.</a:t>
-            </a:r>
-          </a:p>
-          <a:p>
-            <a:endParaRPr lang="en-US" dirty="0"/>
-          </a:p>
-          <a:p>
-            <a:r>
-              <a:rPr lang="en-US" dirty="0"/>
-              <a:t>AIC will select models as “plausible” (within 2 AIC) that contain non-significant (P&gt;0.05) predictors.</a:t>
-            </a:r>
-          </a:p>
-          <a:p>
-            <a:endParaRPr lang="en-US" dirty="0"/>
-          </a:p>
-          <a:p>
-            <a:r>
-              <a:rPr lang="en-US" dirty="0"/>
-              <a:t>Need to examine “goodness of fit” of best models to avoid selecting the best of a bunch of terrible models</a:t>
-            </a:r>
-          </a:p>
-          <a:p>
-            <a:endParaRPr lang="en-US" dirty="0"/>
-          </a:p>
-          <a:p>
-            <a:r>
-              <a:rPr lang="en-US" dirty="0"/>
-              <a:t>When a predictor makes a model better by AIC, this is equivalent to stepwise regression based on a threshold p-value of 0.157 which is much larger than 0.05. </a:t>
-            </a:r>
-          </a:p>
-          <a:p>
-            <a:endParaRPr lang="en-US" dirty="0"/>
-          </a:p>
-          <a:p>
-            <a:r>
-              <a:rPr lang="en-US" dirty="0"/>
-              <a:t>It is difficult to get prediction error and Cis from model averaged predictions</a:t>
+              <a:t>Combining results from multiple models is straight forward</a:t>
             </a:r>
           </a:p>
           <a:p>
@@ -5955,7 +6000,7 @@
     </p:spTree>
     <p:extLst>
       <p:ext uri="{BB962C8B-B14F-4D97-AF65-F5344CB8AC3E}">
-        <p14:creationId xmlns:p14="http://schemas.microsoft.com/office/powerpoint/2010/main" val="3583310291"/>
+        <p14:creationId xmlns:p14="http://schemas.microsoft.com/office/powerpoint/2010/main" val="2185811067"/>
       </p:ext>
     </p:extLst>
   </p:cSld>
@@ -5984,13 +6029,7 @@
       </p:grpSpPr>
       <p:sp>
         <p:nvSpPr>
-          <p:cNvPr id="2" name="Title 1">
-            <a:extLst>
-              <a:ext uri="{FF2B5EF4-FFF2-40B4-BE49-F238E27FC236}">
-                <a16:creationId xmlns:a16="http://schemas.microsoft.com/office/drawing/2014/main" id="{7B4FB1DD-BAD1-0640-A1EA-EEF1DD6718DA}"/>
-              </a:ext>
-            </a:extLst>
-          </p:cNvPr>
+          <p:cNvPr id="2" name="Title 1"/>
           <p:cNvSpPr>
             <a:spLocks noGrp="1"/>
           </p:cNvSpPr>
@@ -6005,20 +6044,14 @@
           <a:p>
             <a:r>
               <a:rPr lang="en-US" dirty="0"/>
-              <a:t>Automatic model selection algorithm (dredging)</a:t>
-            </a:r>
-          </a:p>
-        </p:txBody>
-      </p:sp>
-      <p:sp>
-        <p:nvSpPr>
-          <p:cNvPr id="3" name="Content Placeholder 2">
-            <a:extLst>
-              <a:ext uri="{FF2B5EF4-FFF2-40B4-BE49-F238E27FC236}">
-                <a16:creationId xmlns:a16="http://schemas.microsoft.com/office/drawing/2014/main" id="{AA1D0D94-CD12-424C-A240-F039CC11A80F}"/>
-              </a:ext>
-            </a:extLst>
-          </p:cNvPr>
+              <a:t>AIC challenges</a:t>
+            </a:r>
+          </a:p>
+        </p:txBody>
+      </p:sp>
+      <p:sp>
+        <p:nvSpPr>
+          <p:cNvPr id="3" name="Content Placeholder 2"/>
           <p:cNvSpPr>
             <a:spLocks noGrp="1"/>
           </p:cNvSpPr>
@@ -6026,42 +6059,94 @@
             <p:ph idx="1"/>
           </p:nvPr>
         </p:nvSpPr>
-        <p:spPr/>
-        <p:txBody>
-          <a:bodyPr/>
-          <a:lstStyle/>
-          <a:p>
-            <a:pPr marL="0" indent="0">
-              <a:buNone/>
-            </a:pPr>
-            <a:endParaRPr lang="en-US" dirty="0">
-              <a:hlinkClick r:id="rId2"/>
-            </a:endParaRPr>
-          </a:p>
-          <a:p>
-            <a:r>
-              <a:rPr lang="en-US" dirty="0">
-                <a:hlinkClick r:id="rId2"/>
-              </a:rPr>
-              <a:t>https://stats.stackexchange.com/questions/20836/algorithms-for-automatic-model-selection/20856#20856</a:t>
-            </a:r>
+        <p:spPr>
+          <a:xfrm>
+            <a:off x="628650" y="1518870"/>
+            <a:ext cx="7886700" cy="5339130"/>
+          </a:xfrm>
+        </p:spPr>
+        <p:txBody>
+          <a:bodyPr>
+            <a:normAutofit fontScale="55000" lnSpcReduction="20000"/>
+          </a:bodyPr>
+          <a:lstStyle/>
+          <a:p>
+            <a:r>
+              <a:rPr lang="en-US" dirty="0"/>
+              <a:t>What is the candidate model set?  Omissions or biases in forming model set can result in poor inference/prediction</a:t>
+            </a:r>
+          </a:p>
+          <a:p>
             <a:endParaRPr lang="en-US" dirty="0"/>
           </a:p>
           <a:p>
+            <a:r>
+              <a:rPr lang="en-US" dirty="0"/>
+              <a:t>Using “all possible model subsets” can produce an enormous number of models that is difficult to interpret and results in spurious correlations</a:t>
+            </a:r>
+          </a:p>
+          <a:p>
             <a:endParaRPr lang="en-US" dirty="0"/>
           </a:p>
           <a:p>
             <a:r>
               <a:rPr lang="en-US" dirty="0"/>
-              <a:t>Tip: Don’t do this. </a:t>
-            </a:r>
+              <a:t>If we fit models with several “versions” of a predictor (e.g. Temp, Temp</a:t>
+            </a:r>
+            <a:r>
+              <a:rPr lang="en-US" baseline="30000" dirty="0"/>
+              <a:t>2</a:t>
+            </a:r>
+            <a:r>
+              <a:rPr lang="en-US" dirty="0"/>
+              <a:t>, Log(Temp)) and only one model without this predictor, we are much more likely to find that this predictor is present in one of the best fitting models.</a:t>
+            </a:r>
+          </a:p>
+          <a:p>
+            <a:endParaRPr lang="en-US" dirty="0"/>
+          </a:p>
+          <a:p>
+            <a:r>
+              <a:rPr lang="en-US" dirty="0"/>
+              <a:t>AIC will select models as “plausible” (within 2 AIC) that contain non-significant (P&gt;0.05) predictors.</a:t>
+            </a:r>
+          </a:p>
+          <a:p>
+            <a:endParaRPr lang="en-US" dirty="0"/>
+          </a:p>
+          <a:p>
+            <a:r>
+              <a:rPr lang="en-US" dirty="0"/>
+              <a:t>Need to examine “goodness of fit” of best models to avoid selecting the best of a bunch of terrible models</a:t>
+            </a:r>
+          </a:p>
+          <a:p>
+            <a:endParaRPr lang="en-US" dirty="0"/>
+          </a:p>
+          <a:p>
+            <a:r>
+              <a:rPr lang="en-US" dirty="0"/>
+              <a:t>When a predictor makes a model better by AIC, this is equivalent to stepwise regression based on a threshold p-value of 0.157 which is much larger than 0.05. </a:t>
+            </a:r>
+          </a:p>
+          <a:p>
+            <a:endParaRPr lang="en-US" dirty="0"/>
+          </a:p>
+          <a:p>
+            <a:r>
+              <a:rPr lang="en-US" dirty="0"/>
+              <a:t>It is difficult to get prediction error and Cis from model averaged predictions</a:t>
+            </a:r>
+          </a:p>
+          <a:p>
+            <a:endParaRPr lang="en-US" dirty="0"/>
           </a:p>
         </p:txBody>
       </p:sp>
     </p:spTree>
     <p:extLst>
       <p:ext uri="{BB962C8B-B14F-4D97-AF65-F5344CB8AC3E}">
-        <p14:creationId xmlns:p14="http://schemas.microsoft.com/office/powerpoint/2010/main" val="1703361718"/>
+        <p14:creationId xmlns:p14="http://schemas.microsoft.com/office/powerpoint/2010/main" val="3583310291"/>
       </p:ext>
     </p:extLst>
   </p:cSld>
@@ -6093,7 +6178,7 @@
           <p:cNvPr id="2" name="Title 1">
             <a:extLst>
               <a:ext uri="{FF2B5EF4-FFF2-40B4-BE49-F238E27FC236}">
-                <a16:creationId xmlns:a16="http://schemas.microsoft.com/office/drawing/2014/main" id="{8727EE4B-1932-E946-B68B-5D75BF031FC3}"/>
+                <a16:creationId xmlns:a16="http://schemas.microsoft.com/office/drawing/2014/main" id="{7B4FB1DD-BAD1-0640-A1EA-EEF1DD6718DA}"/>
               </a:ext>
             </a:extLst>
           </p:cNvPr>
@@ -6111,7 +6196,7 @@
           <a:p>
             <a:r>
               <a:rPr lang="en-US" dirty="0"/>
-              <a:t>Model averaging challenges</a:t>
+              <a:t>Automatic model selection algorithm (dredging)</a:t>
             </a:r>
           </a:p>
         </p:txBody>
@@ -6121,7 +6206,7 @@
           <p:cNvPr id="3" name="Content Placeholder 2">
             <a:extLst>
               <a:ext uri="{FF2B5EF4-FFF2-40B4-BE49-F238E27FC236}">
-                <a16:creationId xmlns:a16="http://schemas.microsoft.com/office/drawing/2014/main" id="{0883E609-FCA3-804A-ABE6-8B08E659241F}"/>
+                <a16:creationId xmlns:a16="http://schemas.microsoft.com/office/drawing/2014/main" id="{AA1D0D94-CD12-424C-A240-F039CC11A80F}"/>
               </a:ext>
             </a:extLst>
           </p:cNvPr>
@@ -6137,11 +6222,19 @@
           <a:bodyPr/>
           <a:lstStyle/>
           <a:p>
+            <a:pPr marL="0" indent="0">
+              <a:buNone/>
+            </a:pPr>
+            <a:endParaRPr lang="en-US" dirty="0">
+              <a:hlinkClick r:id="rId2"/>
+            </a:endParaRPr>
+          </a:p>
+          <a:p>
             <a:r>
               <a:rPr lang="en-US" dirty="0">
                 <a:hlinkClick r:id="rId2"/>
               </a:rPr>
-              <a:t>https://theoreticalecology.wordpress.com/2018/05/14/model-averaging-in-ecology-a-review-of-bayesian-information-theoretic-and-tactical-approaches-for-predictive-inference/</a:t>
+              <a:t>https://stats.stackexchange.com/questions/20836/algorithms-for-automatic-model-selection/20856#20856</a:t>
             </a:r>
             <a:endParaRPr lang="en-US" dirty="0"/>
           </a:p>
@@ -6151,24 +6244,7 @@
           <a:p>
             <a:r>
               <a:rPr lang="en-US" dirty="0"/>
-              <a:t>Lots of points here, but model averaging cascades error in bad ways</a:t>
-            </a:r>
-          </a:p>
-          <a:p>
-            <a:endParaRPr lang="en-US" dirty="0"/>
-          </a:p>
-          <a:p>
-            <a:r>
-              <a:rPr lang="en-US" dirty="0"/>
-              <a:t>And see </a:t>
-            </a:r>
-            <a:r>
-              <a:rPr lang="en-US" dirty="0" err="1"/>
-              <a:t>Bolker</a:t>
-            </a:r>
-            <a:r>
-              <a:rPr lang="en-US" dirty="0"/>
-              <a:t> paper on canvas</a:t>
+              <a:t>Tip: Don’t do this. </a:t>
             </a:r>
           </a:p>
         </p:txBody>
@@ -6176,7 +6252,7 @@
     </p:spTree>
     <p:extLst>
       <p:ext uri="{BB962C8B-B14F-4D97-AF65-F5344CB8AC3E}">
-        <p14:creationId xmlns:p14="http://schemas.microsoft.com/office/powerpoint/2010/main" val="2900490986"/>
+        <p14:creationId xmlns:p14="http://schemas.microsoft.com/office/powerpoint/2010/main" val="1703361718"/>
       </p:ext>
     </p:extLst>
   </p:cSld>
@@ -6205,7 +6281,13 @@
       </p:grpSpPr>
       <p:sp>
         <p:nvSpPr>
-          <p:cNvPr id="2" name="Title 1"/>
+          <p:cNvPr id="2" name="Title 1">
+            <a:extLst>
+              <a:ext uri="{FF2B5EF4-FFF2-40B4-BE49-F238E27FC236}">
+                <a16:creationId xmlns:a16="http://schemas.microsoft.com/office/drawing/2014/main" id="{8727EE4B-1932-E946-B68B-5D75BF031FC3}"/>
+              </a:ext>
+            </a:extLst>
+          </p:cNvPr>
           <p:cNvSpPr>
             <a:spLocks noGrp="1"/>
           </p:cNvSpPr>
@@ -6220,14 +6302,20 @@
           <a:p>
             <a:r>
               <a:rPr lang="en-US" dirty="0"/>
-              <a:t>Bayesian approaches</a:t>
-            </a:r>
-          </a:p>
-        </p:txBody>
-      </p:sp>
-      <p:sp>
-        <p:nvSpPr>
-          <p:cNvPr id="3" name="Content Placeholder 2"/>
+              <a:t>Model averaging challenges</a:t>
+            </a:r>
+          </a:p>
+        </p:txBody>
+      </p:sp>
+      <p:sp>
+        <p:nvSpPr>
+          <p:cNvPr id="3" name="Content Placeholder 2">
+            <a:extLst>
+              <a:ext uri="{FF2B5EF4-FFF2-40B4-BE49-F238E27FC236}">
+                <a16:creationId xmlns:a16="http://schemas.microsoft.com/office/drawing/2014/main" id="{0883E609-FCA3-804A-ABE6-8B08E659241F}"/>
+              </a:ext>
+            </a:extLst>
+          </p:cNvPr>
           <p:cNvSpPr>
             <a:spLocks noGrp="1"/>
           </p:cNvSpPr>
@@ -6237,44 +6325,41 @@
         </p:nvSpPr>
         <p:spPr/>
         <p:txBody>
-          <a:bodyPr>
-            <a:normAutofit fontScale="85000" lnSpcReduction="20000"/>
-          </a:bodyPr>
-          <a:lstStyle/>
-          <a:p>
-            <a:r>
-              <a:rPr lang="en-US" dirty="0"/>
-              <a:t>Bayesians consider model selection in a very different way. Dropping parameters from a model is the equivalent of saying the value of the parameter is exactly 0</a:t>
-            </a:r>
-          </a:p>
-          <a:p>
-            <a:pPr lvl="1"/>
-            <a:r>
-              <a:rPr lang="en-US" dirty="0"/>
-              <a:t>This isn’t how Bayesians think about the world (an effect centered on 0 with a range and probability distribution)</a:t>
-            </a:r>
-          </a:p>
-          <a:p>
-            <a:pPr lvl="1"/>
-            <a:r>
-              <a:rPr lang="en-US" dirty="0"/>
-              <a:t>Bayesian methods often center priors on 0 anyway so will intentionally hypothesize a 0 effect</a:t>
-            </a:r>
-          </a:p>
-          <a:p>
-            <a:pPr lvl="1"/>
+          <a:bodyPr/>
+          <a:lstStyle/>
+          <a:p>
+            <a:r>
+              <a:rPr lang="en-US" dirty="0">
+                <a:hlinkClick r:id="rId2"/>
+              </a:rPr>
+              <a:t>https://theoreticalecology.wordpress.com/2018/05/14/model-averaging-in-ecology-a-review-of-bayesian-information-theoretic-and-tactical-approaches-for-predictive-inference/</a:t>
+            </a:r>
             <a:endParaRPr lang="en-US" dirty="0"/>
           </a:p>
           <a:p>
-            <a:r>
-              <a:rPr lang="en-US" dirty="0"/>
-              <a:t>They do use Bayes factors which is the ratio of the marginal likelihoods, essentially the odds in favor of one model vs another</a:t>
-            </a:r>
-          </a:p>
-          <a:p>
-            <a:r>
-              <a:rPr lang="en-US" dirty="0"/>
-              <a:t>Challenge: the marginal likelihood can be challenging to calculate and Bayesian methods are less approachable to many ecologists</a:t>
+            <a:endParaRPr lang="en-US" dirty="0"/>
+          </a:p>
+          <a:p>
+            <a:r>
+              <a:rPr lang="en-US" dirty="0"/>
+              <a:t>Lots of points here, but model averaging cascades error in bad ways</a:t>
+            </a:r>
+          </a:p>
+          <a:p>
+            <a:endParaRPr lang="en-US" dirty="0"/>
+          </a:p>
+          <a:p>
+            <a:r>
+              <a:rPr lang="en-US" dirty="0"/>
+              <a:t>And see </a:t>
+            </a:r>
+            <a:r>
+              <a:rPr lang="en-US" dirty="0" err="1"/>
+              <a:t>Bolker</a:t>
+            </a:r>
+            <a:r>
+              <a:rPr lang="en-US" dirty="0"/>
+              <a:t> paper on canvas</a:t>
             </a:r>
           </a:p>
         </p:txBody>
@@ -6282,7 +6367,7 @@
     </p:spTree>
     <p:extLst>
       <p:ext uri="{BB962C8B-B14F-4D97-AF65-F5344CB8AC3E}">
-        <p14:creationId xmlns:p14="http://schemas.microsoft.com/office/powerpoint/2010/main" val="1024959077"/>
+        <p14:creationId xmlns:p14="http://schemas.microsoft.com/office/powerpoint/2010/main" val="2900490986"/>
       </p:ext>
     </p:extLst>
   </p:cSld>
@@ -6326,7 +6411,7 @@
           <a:p>
             <a:r>
               <a:rPr lang="en-US" dirty="0"/>
-              <a:t>Challenges for all approaches</a:t>
+              <a:t>Bayesian approaches</a:t>
             </a:r>
           </a:p>
         </p:txBody>
@@ -6344,32 +6429,43 @@
         <p:spPr/>
         <p:txBody>
           <a:bodyPr>
-            <a:normAutofit lnSpcReduction="10000"/>
+            <a:normAutofit fontScale="85000" lnSpcReduction="20000"/>
           </a:bodyPr>
           <a:lstStyle/>
           <a:p>
             <a:r>
               <a:rPr lang="en-US" dirty="0"/>
-              <a:t>Including a large list of predictor variables will guarantee that your final or best model includes variables that are correlated with the response simply due to chance</a:t>
+              <a:t>Bayesians consider model selection in a very different way. Dropping parameters from a model is the equivalent of saying the value of the parameter is exactly 0</a:t>
             </a:r>
           </a:p>
           <a:p>
             <a:pPr lvl="1"/>
             <a:r>
               <a:rPr lang="en-US" dirty="0"/>
-              <a:t> multiple regression is a form of multiple comparisons!</a:t>
-            </a:r>
-          </a:p>
-          <a:p>
-            <a:r>
-              <a:rPr lang="en-US" dirty="0"/>
-              <a:t>Any time there is any correlation among predictors, removing or including a predictor will change the coefficient of other correlated predictors</a:t>
-            </a:r>
-          </a:p>
-          <a:p>
-            <a:r>
-              <a:rPr lang="en-US" dirty="0"/>
-              <a:t>No approach fixes these problems</a:t>
+              <a:t>This isn’t how Bayesians think about the world (an effect centered on 0 with a range and probability distribution)</a:t>
+            </a:r>
+          </a:p>
+          <a:p>
+            <a:pPr lvl="1"/>
+            <a:r>
+              <a:rPr lang="en-US" dirty="0"/>
+              <a:t>Bayesian methods often center priors on 0 anyway so will intentionally hypothesize a 0 effect</a:t>
+            </a:r>
+          </a:p>
+          <a:p>
+            <a:pPr lvl="1"/>
+            <a:endParaRPr lang="en-US" dirty="0"/>
+          </a:p>
+          <a:p>
+            <a:r>
+              <a:rPr lang="en-US" dirty="0"/>
+              <a:t>They do use Bayes factors which is the ratio of the marginal likelihoods, essentially the odds in favor of one model vs another</a:t>
+            </a:r>
+          </a:p>
+          <a:p>
+            <a:r>
+              <a:rPr lang="en-US" dirty="0"/>
+              <a:t>Challenge: the marginal likelihood can be challenging to calculate and Bayesian methods are less approachable to many ecologists</a:t>
             </a:r>
           </a:p>
         </p:txBody>
@@ -6377,7 +6473,7 @@
     </p:spTree>
     <p:extLst>
       <p:ext uri="{BB962C8B-B14F-4D97-AF65-F5344CB8AC3E}">
-        <p14:creationId xmlns:p14="http://schemas.microsoft.com/office/powerpoint/2010/main" val="4260278004"/>
+        <p14:creationId xmlns:p14="http://schemas.microsoft.com/office/powerpoint/2010/main" val="1024959077"/>
       </p:ext>
     </p:extLst>
   </p:cSld>
@@ -6421,13 +6517,8 @@
           <a:p>
             <a:r>
               <a:rPr lang="en-US" dirty="0"/>
-              <a:t>Everyone’s a critic</a:t>
-            </a:r>
-            <a:r>
-              <a:rPr lang="mr-IN" dirty="0"/>
-              <a:t>…</a:t>
-            </a:r>
-            <a:endParaRPr lang="en-US" dirty="0"/>
+              <a:t>Challenges for all approaches</a:t>
+            </a:r>
           </a:p>
         </p:txBody>
       </p:sp>
@@ -6443,39 +6534,33 @@
         </p:nvSpPr>
         <p:spPr/>
         <p:txBody>
-          <a:bodyPr/>
-          <a:lstStyle/>
-          <a:p>
-            <a:r>
-              <a:rPr lang="en-US" dirty="0"/>
-              <a:t>First it was LRT</a:t>
-            </a:r>
-          </a:p>
-          <a:p>
-            <a:endParaRPr lang="en-US" dirty="0"/>
-          </a:p>
-          <a:p>
-            <a:r>
-              <a:rPr lang="en-US" dirty="0"/>
-              <a:t>Then it was stepwise</a:t>
-            </a:r>
-          </a:p>
-          <a:p>
-            <a:endParaRPr lang="en-US" dirty="0"/>
-          </a:p>
-          <a:p>
-            <a:r>
-              <a:rPr lang="en-US" dirty="0"/>
-              <a:t>Now it is AIC</a:t>
-            </a:r>
-          </a:p>
-          <a:p>
-            <a:endParaRPr lang="en-US" dirty="0"/>
-          </a:p>
-          <a:p>
-            <a:r>
-              <a:rPr lang="en-US" dirty="0"/>
-              <a:t>What should we do??</a:t>
+          <a:bodyPr>
+            <a:normAutofit lnSpcReduction="10000"/>
+          </a:bodyPr>
+          <a:lstStyle/>
+          <a:p>
+            <a:r>
+              <a:rPr lang="en-US" dirty="0"/>
+              <a:t>Including a large list of predictor variables will guarantee that your final or best model includes variables that are correlated with the response simply due to chance</a:t>
+            </a:r>
+          </a:p>
+          <a:p>
+            <a:pPr lvl="1"/>
+            <a:r>
+              <a:rPr lang="en-US" dirty="0"/>
+              <a:t> multiple regression is a form of multiple comparisons!</a:t>
+            </a:r>
+          </a:p>
+          <a:p>
+            <a:r>
+              <a:rPr lang="en-US" dirty="0"/>
+              <a:t>Any time there is any correlation among predictors, removing or including a predictor will change the coefficient of other correlated predictors</a:t>
+            </a:r>
+          </a:p>
+          <a:p>
+            <a:r>
+              <a:rPr lang="en-US" dirty="0"/>
+              <a:t>No approach fixes these problems</a:t>
             </a:r>
           </a:p>
         </p:txBody>
@@ -6483,7 +6568,7 @@
     </p:spTree>
     <p:extLst>
       <p:ext uri="{BB962C8B-B14F-4D97-AF65-F5344CB8AC3E}">
-        <p14:creationId xmlns:p14="http://schemas.microsoft.com/office/powerpoint/2010/main" val="472774089"/>
+        <p14:creationId xmlns:p14="http://schemas.microsoft.com/office/powerpoint/2010/main" val="4260278004"/>
       </p:ext>
     </p:extLst>
   </p:cSld>
@@ -6527,8 +6612,13 @@
           <a:p>
             <a:r>
               <a:rPr lang="en-US" dirty="0"/>
-              <a:t>Conclusions</a:t>
-            </a:r>
+              <a:t>Everyone’s a critic</a:t>
+            </a:r>
+            <a:r>
+              <a:rPr lang="mr-IN" dirty="0"/>
+              <a:t>…</a:t>
+            </a:r>
+            <a:endParaRPr lang="en-US" dirty="0"/>
           </a:p>
         </p:txBody>
       </p:sp>
@@ -6544,46 +6634,39 @@
         </p:nvSpPr>
         <p:spPr/>
         <p:txBody>
-          <a:bodyPr>
-            <a:normAutofit fontScale="92500" lnSpcReduction="10000"/>
-          </a:bodyPr>
-          <a:lstStyle/>
-          <a:p>
-            <a:r>
-              <a:rPr lang="en-US" dirty="0"/>
-              <a:t>There is no substitute for a priori hypotheses, carefully designed studies or experiments that maximize orthogonality of predictors </a:t>
-            </a:r>
-          </a:p>
-          <a:p>
-            <a:pPr lvl="1"/>
-            <a:r>
-              <a:rPr lang="en-US" dirty="0"/>
-              <a:t>These experiments should have clear-cut hypotheses and measure important variables (consider exclusion of likely “nuisance” variables)</a:t>
-            </a:r>
-          </a:p>
-          <a:p>
-            <a:pPr lvl="1"/>
-            <a:r>
-              <a:rPr lang="en-US" dirty="0"/>
-              <a:t>E.g. Do you need to have soil moisture and daily </a:t>
-            </a:r>
-            <a:r>
-              <a:rPr lang="en-US" dirty="0" err="1"/>
-              <a:t>precip</a:t>
-            </a:r>
-            <a:r>
-              <a:rPr lang="en-US" dirty="0"/>
-              <a:t> in your model? </a:t>
-            </a:r>
-          </a:p>
-          <a:p>
-            <a:pPr lvl="1"/>
+          <a:bodyPr/>
+          <a:lstStyle/>
+          <a:p>
+            <a:r>
+              <a:rPr lang="en-US" dirty="0"/>
+              <a:t>First it was LRT</a:t>
+            </a:r>
+          </a:p>
+          <a:p>
             <a:endParaRPr lang="en-US" dirty="0"/>
           </a:p>
           <a:p>
             <a:r>
               <a:rPr lang="en-US" dirty="0"/>
-              <a:t>We have to accept that in some cases, the limited (observational) data we have collected simply cannot provide a simple clear cut answer to the questions we are posing.</a:t>
+              <a:t>Then it was stepwise</a:t>
+            </a:r>
+          </a:p>
+          <a:p>
+            <a:endParaRPr lang="en-US" dirty="0"/>
+          </a:p>
+          <a:p>
+            <a:r>
+              <a:rPr lang="en-US" dirty="0"/>
+              <a:t>Now it is AIC</a:t>
+            </a:r>
+          </a:p>
+          <a:p>
+            <a:endParaRPr lang="en-US" dirty="0"/>
+          </a:p>
+          <a:p>
+            <a:r>
+              <a:rPr lang="en-US" dirty="0"/>
+              <a:t>What should we do??</a:t>
             </a:r>
           </a:p>
         </p:txBody>
@@ -6591,7 +6674,7 @@
     </p:spTree>
     <p:extLst>
       <p:ext uri="{BB962C8B-B14F-4D97-AF65-F5344CB8AC3E}">
-        <p14:creationId xmlns:p14="http://schemas.microsoft.com/office/powerpoint/2010/main" val="3347799417"/>
+        <p14:creationId xmlns:p14="http://schemas.microsoft.com/office/powerpoint/2010/main" val="472774089"/>
       </p:ext>
     </p:extLst>
   </p:cSld>
@@ -6635,7 +6718,7 @@
           <a:p>
             <a:r>
               <a:rPr lang="en-US" dirty="0"/>
-              <a:t>Summary</a:t>
+              <a:t>Conclusions</a:t>
             </a:r>
           </a:p>
         </p:txBody>
@@ -6650,73 +6733,56 @@
             <p:ph idx="1"/>
           </p:nvPr>
         </p:nvSpPr>
-        <p:spPr>
-          <a:xfrm>
-            <a:off x="628650" y="1572322"/>
-            <a:ext cx="7886700" cy="4604641"/>
-          </a:xfrm>
-        </p:spPr>
-        <p:txBody>
-          <a:bodyPr/>
-          <a:lstStyle/>
-          <a:p>
-            <a:r>
-              <a:rPr lang="en-US" dirty="0"/>
-              <a:t>LRT’s are very useful and well-established, but choosing a path through a complex nest of factors can be challenging</a:t>
+        <p:spPr/>
+        <p:txBody>
+          <a:bodyPr>
+            <a:normAutofit fontScale="92500" lnSpcReduction="10000"/>
+          </a:bodyPr>
+          <a:lstStyle/>
+          <a:p>
+            <a:r>
+              <a:rPr lang="en-US" dirty="0"/>
+              <a:t>There is no substitute for a priori hypotheses, carefully designed studies or experiments that maximize orthogonality of predictors </a:t>
             </a:r>
           </a:p>
           <a:p>
             <a:pPr lvl="1"/>
             <a:r>
               <a:rPr lang="en-US" dirty="0"/>
-              <a:t>Things to be concerned about: </a:t>
-            </a:r>
-          </a:p>
-          <a:p>
-            <a:pPr lvl="2"/>
-            <a:r>
-              <a:rPr lang="en-US" dirty="0"/>
-              <a:t>when one factor is significant only when another factor is in the model</a:t>
-            </a:r>
-          </a:p>
-          <a:p>
-            <a:pPr lvl="2"/>
-            <a:r>
-              <a:rPr lang="en-US" dirty="0"/>
-              <a:t>when predictor variables are highly correlated</a:t>
+              <a:t>These experiments should have clear-cut hypotheses and measure important variables (consider exclusion of likely “nuisance” variables)</a:t>
             </a:r>
           </a:p>
           <a:p>
             <a:pPr lvl="1"/>
             <a:r>
               <a:rPr lang="en-US" dirty="0"/>
-              <a:t>What to do:</a:t>
-            </a:r>
-          </a:p>
-          <a:p>
-            <a:pPr lvl="2"/>
-            <a:r>
-              <a:rPr lang="en-US" dirty="0"/>
-              <a:t>What interesting biology might this be explaining?</a:t>
-            </a:r>
-          </a:p>
-          <a:p>
-            <a:pPr lvl="2"/>
-            <a:r>
-              <a:rPr lang="en-US" dirty="0"/>
-              <a:t>Do you need both variables? </a:t>
-            </a:r>
-          </a:p>
-          <a:p>
-            <a:pPr lvl="2"/>
+              <a:t>E.g. Do you need to have soil moisture and daily </a:t>
+            </a:r>
+            <a:r>
+              <a:rPr lang="en-US" dirty="0" err="1"/>
+              <a:t>precip</a:t>
+            </a:r>
+            <a:r>
+              <a:rPr lang="en-US" dirty="0"/>
+              <a:t> in your model? </a:t>
+            </a:r>
+          </a:p>
+          <a:p>
+            <a:pPr lvl="1"/>
             <a:endParaRPr lang="en-US" dirty="0"/>
+          </a:p>
+          <a:p>
+            <a:r>
+              <a:rPr lang="en-US" dirty="0"/>
+              <a:t>We have to accept that in some cases, the limited (observational) data we have collected simply cannot provide a simple clear cut answer to the questions we are posing.</a:t>
+            </a:r>
           </a:p>
         </p:txBody>
       </p:sp>
     </p:spTree>
     <p:extLst>
       <p:ext uri="{BB962C8B-B14F-4D97-AF65-F5344CB8AC3E}">
-        <p14:creationId xmlns:p14="http://schemas.microsoft.com/office/powerpoint/2010/main" val="1730380054"/>
+        <p14:creationId xmlns:p14="http://schemas.microsoft.com/office/powerpoint/2010/main" val="3347799417"/>
       </p:ext>
     </p:extLst>
   </p:cSld>
@@ -6777,8 +6843,8 @@
         </p:nvSpPr>
         <p:spPr>
           <a:xfrm>
-            <a:off x="628650" y="1438507"/>
-            <a:ext cx="7886700" cy="4738456"/>
+            <a:off x="628650" y="1572322"/>
+            <a:ext cx="7886700" cy="4604641"/>
           </a:xfrm>
         </p:spPr>
         <p:txBody>
@@ -6787,79 +6853,61 @@
           <a:p>
             <a:r>
               <a:rPr lang="en-US" dirty="0"/>
-              <a:t>AIC is well-established, very easy to implement, and appeals to our desire to rank things</a:t>
+              <a:t>LRT’s are very useful and well-established, but choosing a path through a complex nest of factors can be challenging</a:t>
             </a:r>
           </a:p>
           <a:p>
             <a:pPr lvl="1"/>
             <a:r>
               <a:rPr lang="en-US" dirty="0"/>
-              <a:t>Things to be concerned about:</a:t>
+              <a:t>Things to be concerned about: </a:t>
             </a:r>
           </a:p>
           <a:p>
             <a:pPr lvl="2"/>
             <a:r>
               <a:rPr lang="en-US" dirty="0"/>
-              <a:t>Data dredging and thoughtless model selection</a:t>
+              <a:t>when one factor is significant only when another factor is in the model</a:t>
             </a:r>
           </a:p>
           <a:p>
             <a:pPr lvl="2"/>
             <a:r>
               <a:rPr lang="en-US" dirty="0"/>
-              <a:t>Overfitting (adding too many variables)</a:t>
+              <a:t>when predictor variables are highly correlated</a:t>
+            </a:r>
+          </a:p>
+          <a:p>
+            <a:pPr lvl="1"/>
+            <a:r>
+              <a:rPr lang="en-US" dirty="0"/>
+              <a:t>What to do:</a:t>
             </a:r>
           </a:p>
           <a:p>
             <a:pPr lvl="2"/>
             <a:r>
               <a:rPr lang="en-US" dirty="0"/>
-              <a:t>Bad candidate model sets</a:t>
+              <a:t>What interesting biology might this be explaining?</a:t>
             </a:r>
           </a:p>
           <a:p>
             <a:pPr lvl="2"/>
             <a:r>
               <a:rPr lang="en-US" dirty="0"/>
-              <a:t>When AIC tells you remove something you </a:t>
-            </a:r>
-            <a:r>
-              <a:rPr lang="en-US" i="1" dirty="0"/>
-              <a:t>know</a:t>
-            </a:r>
-            <a:r>
-              <a:rPr lang="en-US" dirty="0"/>
-              <a:t> is important</a:t>
-            </a:r>
-          </a:p>
-          <a:p>
-            <a:pPr lvl="1"/>
-            <a:r>
-              <a:rPr lang="en-US" dirty="0"/>
-              <a:t>What to do:</a:t>
+              <a:t>Do you need both variables? </a:t>
             </a:r>
           </a:p>
           <a:p>
             <a:pPr lvl="2"/>
-            <a:r>
-              <a:rPr lang="en-US" dirty="0"/>
-              <a:t>Use for exploratory analysis, but take results with a big grain of salt</a:t>
-            </a:r>
-          </a:p>
-          <a:p>
-            <a:pPr lvl="2"/>
-            <a:r>
-              <a:rPr lang="en-US" dirty="0"/>
-              <a:t>Use as final results only if it agrees with other methods</a:t>
-            </a:r>
+            <a:endParaRPr lang="en-US" dirty="0"/>
           </a:p>
         </p:txBody>
       </p:sp>
     </p:spTree>
     <p:extLst>
       <p:ext uri="{BB962C8B-B14F-4D97-AF65-F5344CB8AC3E}">
-        <p14:creationId xmlns:p14="http://schemas.microsoft.com/office/powerpoint/2010/main" val="1933073373"/>
+        <p14:creationId xmlns:p14="http://schemas.microsoft.com/office/powerpoint/2010/main" val="1730380054"/>
       </p:ext>
     </p:extLst>
   </p:cSld>
@@ -6896,10 +6944,32 @@
             <p:ph type="title"/>
           </p:nvPr>
         </p:nvSpPr>
+        <p:spPr/>
+        <p:txBody>
+          <a:bodyPr/>
+          <a:lstStyle/>
+          <a:p>
+            <a:r>
+              <a:rPr lang="en-US" dirty="0"/>
+              <a:t>Summary</a:t>
+            </a:r>
+          </a:p>
+        </p:txBody>
+      </p:sp>
+      <p:sp>
+        <p:nvSpPr>
+          <p:cNvPr id="3" name="Content Placeholder 2"/>
+          <p:cNvSpPr>
+            <a:spLocks noGrp="1"/>
+          </p:cNvSpPr>
+          <p:nvPr>
+            <p:ph idx="1"/>
+          </p:nvPr>
+        </p:nvSpPr>
         <p:spPr>
           <a:xfrm>
-            <a:off x="628650" y="220163"/>
-            <a:ext cx="7886700" cy="1325563"/>
+            <a:off x="628650" y="1438507"/>
+            <a:ext cx="7886700" cy="4738456"/>
           </a:xfrm>
         </p:spPr>
         <p:txBody>
@@ -6908,93 +6978,71 @@
           <a:p>
             <a:r>
               <a:rPr lang="en-US" dirty="0"/>
-              <a:t>My Own Recommendations</a:t>
-            </a:r>
-          </a:p>
-        </p:txBody>
-      </p:sp>
-      <p:sp>
-        <p:nvSpPr>
-          <p:cNvPr id="3" name="Content Placeholder 2"/>
-          <p:cNvSpPr>
-            <a:spLocks noGrp="1"/>
-          </p:cNvSpPr>
-          <p:nvPr>
-            <p:ph idx="1"/>
-          </p:nvPr>
-        </p:nvSpPr>
-        <p:spPr>
-          <a:xfrm>
-            <a:off x="584046" y="1510549"/>
-            <a:ext cx="8147360" cy="5358600"/>
-          </a:xfrm>
-        </p:spPr>
-        <p:txBody>
-          <a:bodyPr>
-            <a:noAutofit/>
-          </a:bodyPr>
-          <a:lstStyle/>
-          <a:p>
-            <a:r>
-              <a:rPr lang="en-US" sz="1600" dirty="0"/>
-              <a:t>Avoid automatic procedures for stepwise methods based on AIC or P-values because they mask the dropping of variables that have P-values or AIC values just barely over the threshold</a:t>
-            </a:r>
-          </a:p>
-          <a:p>
-            <a:r>
-              <a:rPr lang="en-US" sz="1600" dirty="0"/>
-              <a:t>Compare AIC and P-value approaches to understand what is producing the results you are getting</a:t>
-            </a:r>
-          </a:p>
-          <a:p>
-            <a:r>
-              <a:rPr lang="en-US" sz="1600" dirty="0"/>
-              <a:t>Don’t remove variables you think are important just because of a p-value or AIC threshold</a:t>
-            </a:r>
-          </a:p>
-          <a:p>
-            <a:r>
-              <a:rPr lang="en-US" sz="1600" dirty="0"/>
-              <a:t>Never use forward stepwise regression</a:t>
-            </a:r>
-          </a:p>
-          <a:p>
-            <a:r>
-              <a:rPr lang="en-US" sz="1600" dirty="0"/>
-              <a:t>If you use a manual version of backwards stepwise regression, do it knowledgeably</a:t>
+              <a:t>AIC is well-established, very easy to implement, and appeals to our desire to rank things</a:t>
             </a:r>
           </a:p>
           <a:p>
             <a:pPr lvl="1"/>
             <a:r>
-              <a:rPr lang="en-US" sz="1600" dirty="0"/>
-              <a:t>Examine correlation among predictors</a:t>
+              <a:rPr lang="en-US" dirty="0"/>
+              <a:t>Things to be concerned about:</a:t>
+            </a:r>
+          </a:p>
+          <a:p>
+            <a:pPr lvl="2"/>
+            <a:r>
+              <a:rPr lang="en-US" dirty="0"/>
+              <a:t>Data dredging and thoughtless model selection</a:t>
+            </a:r>
+          </a:p>
+          <a:p>
+            <a:pPr lvl="2"/>
+            <a:r>
+              <a:rPr lang="en-US" dirty="0"/>
+              <a:t>Overfitting (adding too many variables)</a:t>
+            </a:r>
+          </a:p>
+          <a:p>
+            <a:pPr lvl="2"/>
+            <a:r>
+              <a:rPr lang="en-US" dirty="0"/>
+              <a:t>Bad candidate model sets</a:t>
+            </a:r>
+          </a:p>
+          <a:p>
+            <a:pPr lvl="2"/>
+            <a:r>
+              <a:rPr lang="en-US" dirty="0"/>
+              <a:t>When AIC tells you remove something you </a:t>
+            </a:r>
+            <a:r>
+              <a:rPr lang="en-US" i="1" dirty="0"/>
+              <a:t>know</a:t>
+            </a:r>
+            <a:r>
+              <a:rPr lang="en-US" dirty="0"/>
+              <a:t> is important</a:t>
             </a:r>
           </a:p>
           <a:p>
             <a:pPr lvl="1"/>
             <a:r>
-              <a:rPr lang="en-US" sz="1600" dirty="0"/>
-              <a:t>Acknowledge that marginal results (e.g. P-values between 0.2 and 0.01) may not be robust in either direction</a:t>
-            </a:r>
-          </a:p>
-          <a:p>
-            <a:pPr lvl="1"/>
-            <a:r>
-              <a:rPr lang="en-US" sz="1600" dirty="0"/>
-              <a:t>Don’t remove variables with a p-value of  &lt; 0.25 unless biological validity could actually be considered to be 0</a:t>
-            </a:r>
-          </a:p>
-          <a:p>
-            <a:r>
-              <a:rPr lang="en-US" sz="1600" dirty="0"/>
-              <a:t>Use cross validation or bootstrapping to assess model accuracy</a:t>
-            </a:r>
-          </a:p>
-          <a:p>
-            <a:r>
-              <a:rPr lang="en-US" sz="1600" dirty="0"/>
-              <a:t>Interpret analyses honestly and accurately in publications</a:t>
+              <a:rPr lang="en-US" dirty="0"/>
+              <a:t>What to do:</a:t>
+            </a:r>
+          </a:p>
+          <a:p>
+            <a:pPr lvl="2"/>
+            <a:r>
+              <a:rPr lang="en-US" dirty="0"/>
+              <a:t>Use for exploratory analysis, but take results with a big grain of salt</a:t>
+            </a:r>
+          </a:p>
+          <a:p>
+            <a:pPr lvl="2"/>
+            <a:r>
+              <a:rPr lang="en-US" dirty="0"/>
+              <a:t>Use as final results only if it agrees with other methods</a:t>
             </a:r>
           </a:p>
         </p:txBody>
@@ -7002,7 +7050,7 @@
     </p:spTree>
     <p:extLst>
       <p:ext uri="{BB962C8B-B14F-4D97-AF65-F5344CB8AC3E}">
-        <p14:creationId xmlns:p14="http://schemas.microsoft.com/office/powerpoint/2010/main" val="1659554452"/>
+        <p14:creationId xmlns:p14="http://schemas.microsoft.com/office/powerpoint/2010/main" val="1933073373"/>
       </p:ext>
     </p:extLst>
   </p:cSld>
@@ -7124,6 +7172,149 @@
 </file>
 
 <file path=ppt/slides/slide40.xml><?xml version="1.0" encoding="utf-8"?>
+<p:sld xmlns:a="http://schemas.openxmlformats.org/drawingml/2006/main" xmlns:r="http://schemas.openxmlformats.org/officeDocument/2006/relationships" xmlns:p="http://schemas.openxmlformats.org/presentationml/2006/main">
+  <p:cSld>
+    <p:spTree>
+      <p:nvGrpSpPr>
+        <p:cNvPr id="1" name=""/>
+        <p:cNvGrpSpPr/>
+        <p:nvPr/>
+      </p:nvGrpSpPr>
+      <p:grpSpPr>
+        <a:xfrm>
+          <a:off x="0" y="0"/>
+          <a:ext cx="0" cy="0"/>
+          <a:chOff x="0" y="0"/>
+          <a:chExt cx="0" cy="0"/>
+        </a:xfrm>
+      </p:grpSpPr>
+      <p:sp>
+        <p:nvSpPr>
+          <p:cNvPr id="2" name="Title 1"/>
+          <p:cNvSpPr>
+            <a:spLocks noGrp="1"/>
+          </p:cNvSpPr>
+          <p:nvPr>
+            <p:ph type="title"/>
+          </p:nvPr>
+        </p:nvSpPr>
+        <p:spPr>
+          <a:xfrm>
+            <a:off x="628650" y="220163"/>
+            <a:ext cx="7886700" cy="1325563"/>
+          </a:xfrm>
+        </p:spPr>
+        <p:txBody>
+          <a:bodyPr/>
+          <a:lstStyle/>
+          <a:p>
+            <a:r>
+              <a:rPr lang="en-US" dirty="0"/>
+              <a:t>My Own Recommendations</a:t>
+            </a:r>
+          </a:p>
+        </p:txBody>
+      </p:sp>
+      <p:sp>
+        <p:nvSpPr>
+          <p:cNvPr id="3" name="Content Placeholder 2"/>
+          <p:cNvSpPr>
+            <a:spLocks noGrp="1"/>
+          </p:cNvSpPr>
+          <p:nvPr>
+            <p:ph idx="1"/>
+          </p:nvPr>
+        </p:nvSpPr>
+        <p:spPr>
+          <a:xfrm>
+            <a:off x="584046" y="1510549"/>
+            <a:ext cx="8147360" cy="5358600"/>
+          </a:xfrm>
+        </p:spPr>
+        <p:txBody>
+          <a:bodyPr>
+            <a:noAutofit/>
+          </a:bodyPr>
+          <a:lstStyle/>
+          <a:p>
+            <a:r>
+              <a:rPr lang="en-US" sz="1600" dirty="0"/>
+              <a:t>Avoid automatic procedures for stepwise methods based on AIC or P-values because they mask the dropping of variables that have P-values or AIC values just barely over the threshold</a:t>
+            </a:r>
+          </a:p>
+          <a:p>
+            <a:r>
+              <a:rPr lang="en-US" sz="1600" dirty="0"/>
+              <a:t>Compare AIC and P-value approaches to understand what is producing the results you are getting</a:t>
+            </a:r>
+          </a:p>
+          <a:p>
+            <a:r>
+              <a:rPr lang="en-US" sz="1600" dirty="0"/>
+              <a:t>Don’t remove variables you think are important just because of a p-value or AIC threshold</a:t>
+            </a:r>
+          </a:p>
+          <a:p>
+            <a:r>
+              <a:rPr lang="en-US" sz="1600" dirty="0"/>
+              <a:t>Never use forward stepwise regression</a:t>
+            </a:r>
+          </a:p>
+          <a:p>
+            <a:r>
+              <a:rPr lang="en-US" sz="1600" dirty="0"/>
+              <a:t>If you use a manual version of backwards stepwise regression, do it knowledgeably</a:t>
+            </a:r>
+          </a:p>
+          <a:p>
+            <a:pPr lvl="1"/>
+            <a:r>
+              <a:rPr lang="en-US" sz="1600" dirty="0"/>
+              <a:t>Examine correlation among predictors</a:t>
+            </a:r>
+          </a:p>
+          <a:p>
+            <a:pPr lvl="1"/>
+            <a:r>
+              <a:rPr lang="en-US" sz="1600" dirty="0"/>
+              <a:t>Acknowledge that marginal results (e.g. P-values between 0.2 and 0.01) may not be robust in either direction</a:t>
+            </a:r>
+          </a:p>
+          <a:p>
+            <a:pPr lvl="1"/>
+            <a:r>
+              <a:rPr lang="en-US" sz="1600" dirty="0"/>
+              <a:t>Don’t remove variables with a p-value of  &lt; 0.25 unless biological validity could actually be considered to be 0</a:t>
+            </a:r>
+          </a:p>
+          <a:p>
+            <a:r>
+              <a:rPr lang="en-US" sz="1600" dirty="0"/>
+              <a:t>Use cross validation or bootstrapping to assess model accuracy</a:t>
+            </a:r>
+          </a:p>
+          <a:p>
+            <a:r>
+              <a:rPr lang="en-US" sz="1600" dirty="0"/>
+              <a:t>Interpret analyses honestly and accurately in publications</a:t>
+            </a:r>
+          </a:p>
+        </p:txBody>
+      </p:sp>
+    </p:spTree>
+    <p:extLst>
+      <p:ext uri="{BB962C8B-B14F-4D97-AF65-F5344CB8AC3E}">
+        <p14:creationId xmlns:p14="http://schemas.microsoft.com/office/powerpoint/2010/main" val="1659554452"/>
+      </p:ext>
+    </p:extLst>
+  </p:cSld>
+  <p:clrMapOvr>
+    <a:masterClrMapping/>
+  </p:clrMapOvr>
+</p:sld>
+</file>
+
+<file path=ppt/slides/slide41.xml><?xml version="1.0" encoding="utf-8"?>
 <p:sld xmlns:a="http://schemas.openxmlformats.org/drawingml/2006/main" xmlns:r="http://schemas.openxmlformats.org/officeDocument/2006/relationships" xmlns:p="http://schemas.openxmlformats.org/presentationml/2006/main">
   <p:cSld>
     <p:spTree>

</xml_diff>